<commit_message>
Updates to manual from Europe feedback and for the CYW943907AEVAL1F kit.
</commit_message>
<xml_diff>
--- a/labmanual/English/WW101-Binder-Cover.pptx
+++ b/labmanual/English/WW101-Binder-Cover.pptx
@@ -244,7 +244,7 @@
           <a:p>
             <a:fld id="{FD9117CB-CD87-A145-B0DD-B1FF23D56DC0}" type="datetimeFigureOut">
               <a:rPr lang="en-US" smtClean="0"/>
-              <a:t>2/1/2017</a:t>
+              <a:t>4/3/2017</a:t>
             </a:fld>
             <a:endParaRPr lang="en-US"/>
           </a:p>
@@ -414,7 +414,7 @@
           <a:p>
             <a:fld id="{FD9117CB-CD87-A145-B0DD-B1FF23D56DC0}" type="datetimeFigureOut">
               <a:rPr lang="en-US" smtClean="0"/>
-              <a:t>2/1/2017</a:t>
+              <a:t>4/3/2017</a:t>
             </a:fld>
             <a:endParaRPr lang="en-US"/>
           </a:p>
@@ -594,7 +594,7 @@
           <a:p>
             <a:fld id="{FD9117CB-CD87-A145-B0DD-B1FF23D56DC0}" type="datetimeFigureOut">
               <a:rPr lang="en-US" smtClean="0"/>
-              <a:t>2/1/2017</a:t>
+              <a:t>4/3/2017</a:t>
             </a:fld>
             <a:endParaRPr lang="en-US"/>
           </a:p>
@@ -764,7 +764,7 @@
           <a:p>
             <a:fld id="{FD9117CB-CD87-A145-B0DD-B1FF23D56DC0}" type="datetimeFigureOut">
               <a:rPr lang="en-US" smtClean="0"/>
-              <a:t>2/1/2017</a:t>
+              <a:t>4/3/2017</a:t>
             </a:fld>
             <a:endParaRPr lang="en-US"/>
           </a:p>
@@ -1008,7 +1008,7 @@
           <a:p>
             <a:fld id="{FD9117CB-CD87-A145-B0DD-B1FF23D56DC0}" type="datetimeFigureOut">
               <a:rPr lang="en-US" smtClean="0"/>
-              <a:t>2/1/2017</a:t>
+              <a:t>4/3/2017</a:t>
             </a:fld>
             <a:endParaRPr lang="en-US"/>
           </a:p>
@@ -1240,7 +1240,7 @@
           <a:p>
             <a:fld id="{FD9117CB-CD87-A145-B0DD-B1FF23D56DC0}" type="datetimeFigureOut">
               <a:rPr lang="en-US" smtClean="0"/>
-              <a:t>2/1/2017</a:t>
+              <a:t>4/3/2017</a:t>
             </a:fld>
             <a:endParaRPr lang="en-US"/>
           </a:p>
@@ -1607,7 +1607,7 @@
           <a:p>
             <a:fld id="{FD9117CB-CD87-A145-B0DD-B1FF23D56DC0}" type="datetimeFigureOut">
               <a:rPr lang="en-US" smtClean="0"/>
-              <a:t>2/1/2017</a:t>
+              <a:t>4/3/2017</a:t>
             </a:fld>
             <a:endParaRPr lang="en-US"/>
           </a:p>
@@ -1725,7 +1725,7 @@
           <a:p>
             <a:fld id="{FD9117CB-CD87-A145-B0DD-B1FF23D56DC0}" type="datetimeFigureOut">
               <a:rPr lang="en-US" smtClean="0"/>
-              <a:t>2/1/2017</a:t>
+              <a:t>4/3/2017</a:t>
             </a:fld>
             <a:endParaRPr lang="en-US"/>
           </a:p>
@@ -1820,7 +1820,7 @@
           <a:p>
             <a:fld id="{FD9117CB-CD87-A145-B0DD-B1FF23D56DC0}" type="datetimeFigureOut">
               <a:rPr lang="en-US" smtClean="0"/>
-              <a:t>2/1/2017</a:t>
+              <a:t>4/3/2017</a:t>
             </a:fld>
             <a:endParaRPr lang="en-US"/>
           </a:p>
@@ -2097,7 +2097,7 @@
           <a:p>
             <a:fld id="{FD9117CB-CD87-A145-B0DD-B1FF23D56DC0}" type="datetimeFigureOut">
               <a:rPr lang="en-US" smtClean="0"/>
-              <a:t>2/1/2017</a:t>
+              <a:t>4/3/2017</a:t>
             </a:fld>
             <a:endParaRPr lang="en-US"/>
           </a:p>
@@ -2354,7 +2354,7 @@
           <a:p>
             <a:fld id="{FD9117CB-CD87-A145-B0DD-B1FF23D56DC0}" type="datetimeFigureOut">
               <a:rPr lang="en-US" smtClean="0"/>
-              <a:t>2/1/2017</a:t>
+              <a:t>4/3/2017</a:t>
             </a:fld>
             <a:endParaRPr lang="en-US"/>
           </a:p>
@@ -2567,7 +2567,7 @@
           <a:p>
             <a:fld id="{FD9117CB-CD87-A145-B0DD-B1FF23D56DC0}" type="datetimeFigureOut">
               <a:rPr lang="en-US" smtClean="0"/>
-              <a:t>2/1/2017</a:t>
+              <a:t>4/3/2017</a:t>
             </a:fld>
             <a:endParaRPr lang="en-US"/>
           </a:p>
@@ -3066,11 +3066,7 @@
             <a:pPr algn="ctr"/>
             <a:r>
               <a:rPr lang="en-US" sz="2400" dirty="0" smtClean="0"/>
-              <a:t>Greg </a:t>
-            </a:r>
-            <a:r>
-              <a:rPr lang="en-US" sz="2400" dirty="0" smtClean="0"/>
-              <a:t>Landry</a:t>
+              <a:t>Greg Landry</a:t>
             </a:r>
           </a:p>
           <a:p>
@@ -3079,17 +3075,12 @@
               <a:rPr lang="en-US" sz="2400" dirty="0" smtClean="0"/>
               <a:t>Mike Noel</a:t>
             </a:r>
-            <a:endParaRPr lang="en-US" sz="2400" dirty="0" smtClean="0"/>
           </a:p>
           <a:p>
             <a:pPr algn="ctr"/>
             <a:r>
               <a:rPr lang="en-US" sz="2400" dirty="0" smtClean="0"/>
-              <a:t>James </a:t>
-            </a:r>
-            <a:r>
-              <a:rPr lang="en-US" sz="2400" dirty="0" smtClean="0"/>
-              <a:t>Dougherty</a:t>
+              <a:t>James Dougherty</a:t>
             </a:r>
           </a:p>
           <a:p>
@@ -3163,8 +3154,12 @@
           <a:p>
             <a:pPr algn="ctr"/>
             <a:r>
+              <a:rPr lang="en-US" b="1" dirty="0" smtClean="0"/>
+              <a:t>WPA2</a:t>
+            </a:r>
+            <a:r>
               <a:rPr lang="en-US" dirty="0" smtClean="0"/>
-              <a:t>WPA2 SSID = WW101WPA PW=</a:t>
+              <a:t> SSID = WW101WPA PW=</a:t>
             </a:r>
             <a:r>
               <a:rPr lang="en-US" dirty="0"/>
@@ -3182,8 +3177,8 @@
         </p:nvSpPr>
         <p:spPr>
           <a:xfrm>
-            <a:off x="1041325" y="6688699"/>
-            <a:ext cx="4632615" cy="369332"/>
+            <a:off x="179294" y="5533054"/>
+            <a:ext cx="6490447" cy="2800767"/>
           </a:xfrm>
           <a:prstGeom prst="rect">
             <a:avLst/>
@@ -3191,23 +3186,100 @@
           <a:noFill/>
         </p:spPr>
         <p:txBody>
-          <a:bodyPr wrap="none" rtlCol="0">
+          <a:bodyPr wrap="square" rtlCol="0">
             <a:spAutoFit/>
           </a:bodyPr>
           <a:lstStyle/>
           <a:p>
-            <a:pPr algn="ctr"/>
-            <a:r>
-              <a:rPr lang="en-US" dirty="0" smtClean="0"/>
-              <a:t>Don</a:t>
-            </a:r>
-            <a:r>
-              <a:rPr lang="uk-UA" dirty="0" smtClean="0"/>
-              <a:t>’</a:t>
-            </a:r>
-            <a:r>
-              <a:rPr lang="en-US" dirty="0" smtClean="0"/>
-              <a:t>t forget to ctrl-s SAVE before you run Make</a:t>
+            <a:r>
+              <a:rPr lang="en-US" sz="1600" dirty="0" smtClean="0"/>
+              <a:t>Trouble Shooting Guide: </a:t>
+            </a:r>
+          </a:p>
+          <a:p>
+            <a:endParaRPr lang="en-US" sz="1600" dirty="0"/>
+          </a:p>
+          <a:p>
+            <a:r>
+              <a:rPr lang="en-US" sz="1600" dirty="0" smtClean="0"/>
+              <a:t>Did you SAVE before you ran Make</a:t>
+            </a:r>
+          </a:p>
+          <a:p>
+            <a:r>
+              <a:rPr lang="en-US" sz="1600" dirty="0" smtClean="0"/>
+              <a:t>Did you call </a:t>
+            </a:r>
+            <a:r>
+              <a:rPr lang="en-US" sz="1600" dirty="0" err="1" smtClean="0"/>
+              <a:t>wiced_init</a:t>
+            </a:r>
+            <a:r>
+              <a:rPr lang="en-US" sz="1600" dirty="0" smtClean="0"/>
+              <a:t> before any other </a:t>
+            </a:r>
+            <a:r>
+              <a:rPr lang="en-US" sz="1600" smtClean="0"/>
+              <a:t>WICEDfunction</a:t>
+            </a:r>
+            <a:endParaRPr lang="en-US" sz="1600" dirty="0" smtClean="0"/>
+          </a:p>
+          <a:p>
+            <a:r>
+              <a:rPr lang="en-US" sz="1600" dirty="0" smtClean="0"/>
+              <a:t>Did you call the </a:t>
+            </a:r>
+            <a:r>
+              <a:rPr lang="en-US" sz="1600" dirty="0" err="1" smtClean="0"/>
+              <a:t>init</a:t>
+            </a:r>
+            <a:r>
+              <a:rPr lang="en-US" sz="1600" dirty="0" smtClean="0"/>
+              <a:t> function for each peripheral used</a:t>
+            </a:r>
+          </a:p>
+          <a:p>
+            <a:r>
+              <a:rPr lang="en-US" sz="1600" dirty="0" smtClean="0"/>
+              <a:t>Do the project folder, C file, and make file all have the same name</a:t>
+            </a:r>
+          </a:p>
+          <a:p>
+            <a:r>
+              <a:rPr lang="en-US" sz="1600" dirty="0" smtClean="0"/>
+              <a:t>Is the APP NAME in the make file unique</a:t>
+            </a:r>
+          </a:p>
+          <a:p>
+            <a:r>
+              <a:rPr lang="en-US" sz="1600" dirty="0" smtClean="0"/>
+              <a:t>Did you clean after modifying certificates</a:t>
+            </a:r>
+          </a:p>
+          <a:p>
+            <a:r>
+              <a:rPr lang="en-US" sz="1600" dirty="0" smtClean="0"/>
+              <a:t>Did you call </a:t>
+            </a:r>
+            <a:r>
+              <a:rPr lang="en-US" sz="1600" dirty="0" err="1" smtClean="0"/>
+              <a:t>wiced_network_up</a:t>
+            </a:r>
+            <a:r>
+              <a:rPr lang="en-US" sz="1600" dirty="0" smtClean="0"/>
+              <a:t> before any network activities</a:t>
+            </a:r>
+          </a:p>
+          <a:p>
+            <a:r>
+              <a:rPr lang="en-US" sz="1600" dirty="0" smtClean="0"/>
+              <a:t>Did you create all structures before referencing them in function calls</a:t>
+            </a:r>
+          </a:p>
+          <a:p>
+            <a:r>
+              <a:rPr lang="en-US" sz="1600" dirty="0" smtClean="0"/>
+              <a:t>Did you use WPRINT_APP_INFO for debugging (e.g. WICED return codes)</a:t>
             </a:r>
           </a:p>
         </p:txBody>
@@ -3266,8 +3338,12 @@
           <a:p>
             <a:pPr algn="ctr"/>
             <a:r>
+              <a:rPr lang="en-US" b="1" dirty="0" smtClean="0"/>
+              <a:t>OPEN</a:t>
+            </a:r>
+            <a:r>
               <a:rPr lang="en-US" dirty="0" smtClean="0"/>
-              <a:t>OPEN SSID = WW101OPEN</a:t>
+              <a:t> SSID = WW101OPEN</a:t>
             </a:r>
           </a:p>
         </p:txBody>
@@ -3296,8 +3372,12 @@
           <a:p>
             <a:pPr algn="ctr"/>
             <a:r>
+              <a:rPr lang="en-US" b="1" dirty="0" smtClean="0"/>
+              <a:t>WEP</a:t>
+            </a:r>
+            <a:r>
               <a:rPr lang="en-US" dirty="0" smtClean="0"/>
-              <a:t>WEP SSID = WW101WEP PW=</a:t>
+              <a:t> SSID = WW101WEP PW=</a:t>
             </a:r>
             <a:r>
               <a:rPr lang="en-US" dirty="0" err="1" smtClean="0"/>
@@ -3403,7 +3483,7 @@
             </a:r>
             <a:r>
               <a:rPr lang="en-US" sz="1050" smtClean="0"/>
-              <a:t>ersion 1.1</a:t>
+              <a:t>ersion 1.2</a:t>
             </a:r>
             <a:endParaRPr lang="en-US" sz="1050" dirty="0"/>
           </a:p>

</xml_diff>

<commit_message>
Remove open and WEP network.
</commit_message>
<xml_diff>
--- a/labmanual/English/WW101-Binder-Cover.pptx
+++ b/labmanual/English/WW101-Binder-Cover.pptx
@@ -244,7 +244,7 @@
           <a:p>
             <a:fld id="{FD9117CB-CD87-A145-B0DD-B1FF23D56DC0}" type="datetimeFigureOut">
               <a:rPr lang="en-US" smtClean="0"/>
-              <a:t>4/3/2017</a:t>
+              <a:t>5/16/2017</a:t>
             </a:fld>
             <a:endParaRPr lang="en-US"/>
           </a:p>
@@ -414,7 +414,7 @@
           <a:p>
             <a:fld id="{FD9117CB-CD87-A145-B0DD-B1FF23D56DC0}" type="datetimeFigureOut">
               <a:rPr lang="en-US" smtClean="0"/>
-              <a:t>4/3/2017</a:t>
+              <a:t>5/16/2017</a:t>
             </a:fld>
             <a:endParaRPr lang="en-US"/>
           </a:p>
@@ -594,7 +594,7 @@
           <a:p>
             <a:fld id="{FD9117CB-CD87-A145-B0DD-B1FF23D56DC0}" type="datetimeFigureOut">
               <a:rPr lang="en-US" smtClean="0"/>
-              <a:t>4/3/2017</a:t>
+              <a:t>5/16/2017</a:t>
             </a:fld>
             <a:endParaRPr lang="en-US"/>
           </a:p>
@@ -764,7 +764,7 @@
           <a:p>
             <a:fld id="{FD9117CB-CD87-A145-B0DD-B1FF23D56DC0}" type="datetimeFigureOut">
               <a:rPr lang="en-US" smtClean="0"/>
-              <a:t>4/3/2017</a:t>
+              <a:t>5/16/2017</a:t>
             </a:fld>
             <a:endParaRPr lang="en-US"/>
           </a:p>
@@ -1008,7 +1008,7 @@
           <a:p>
             <a:fld id="{FD9117CB-CD87-A145-B0DD-B1FF23D56DC0}" type="datetimeFigureOut">
               <a:rPr lang="en-US" smtClean="0"/>
-              <a:t>4/3/2017</a:t>
+              <a:t>5/16/2017</a:t>
             </a:fld>
             <a:endParaRPr lang="en-US"/>
           </a:p>
@@ -1240,7 +1240,7 @@
           <a:p>
             <a:fld id="{FD9117CB-CD87-A145-B0DD-B1FF23D56DC0}" type="datetimeFigureOut">
               <a:rPr lang="en-US" smtClean="0"/>
-              <a:t>4/3/2017</a:t>
+              <a:t>5/16/2017</a:t>
             </a:fld>
             <a:endParaRPr lang="en-US"/>
           </a:p>
@@ -1607,7 +1607,7 @@
           <a:p>
             <a:fld id="{FD9117CB-CD87-A145-B0DD-B1FF23D56DC0}" type="datetimeFigureOut">
               <a:rPr lang="en-US" smtClean="0"/>
-              <a:t>4/3/2017</a:t>
+              <a:t>5/16/2017</a:t>
             </a:fld>
             <a:endParaRPr lang="en-US"/>
           </a:p>
@@ -1725,7 +1725,7 @@
           <a:p>
             <a:fld id="{FD9117CB-CD87-A145-B0DD-B1FF23D56DC0}" type="datetimeFigureOut">
               <a:rPr lang="en-US" smtClean="0"/>
-              <a:t>4/3/2017</a:t>
+              <a:t>5/16/2017</a:t>
             </a:fld>
             <a:endParaRPr lang="en-US"/>
           </a:p>
@@ -1820,7 +1820,7 @@
           <a:p>
             <a:fld id="{FD9117CB-CD87-A145-B0DD-B1FF23D56DC0}" type="datetimeFigureOut">
               <a:rPr lang="en-US" smtClean="0"/>
-              <a:t>4/3/2017</a:t>
+              <a:t>5/16/2017</a:t>
             </a:fld>
             <a:endParaRPr lang="en-US"/>
           </a:p>
@@ -2097,7 +2097,7 @@
           <a:p>
             <a:fld id="{FD9117CB-CD87-A145-B0DD-B1FF23D56DC0}" type="datetimeFigureOut">
               <a:rPr lang="en-US" smtClean="0"/>
-              <a:t>4/3/2017</a:t>
+              <a:t>5/16/2017</a:t>
             </a:fld>
             <a:endParaRPr lang="en-US"/>
           </a:p>
@@ -2354,7 +2354,7 @@
           <a:p>
             <a:fld id="{FD9117CB-CD87-A145-B0DD-B1FF23D56DC0}" type="datetimeFigureOut">
               <a:rPr lang="en-US" smtClean="0"/>
-              <a:t>4/3/2017</a:t>
+              <a:t>5/16/2017</a:t>
             </a:fld>
             <a:endParaRPr lang="en-US"/>
           </a:p>
@@ -2567,7 +2567,7 @@
           <a:p>
             <a:fld id="{FD9117CB-CD87-A145-B0DD-B1FF23D56DC0}" type="datetimeFigureOut">
               <a:rPr lang="en-US" smtClean="0"/>
-              <a:t>4/3/2017</a:t>
+              <a:t>5/16/2017</a:t>
             </a:fld>
             <a:endParaRPr lang="en-US"/>
           </a:p>
@@ -3138,8 +3138,8 @@
         </p:nvSpPr>
         <p:spPr>
           <a:xfrm>
-            <a:off x="1532454" y="1939208"/>
-            <a:ext cx="4078937" cy="369332"/>
+            <a:off x="832268" y="1137463"/>
+            <a:ext cx="5184497" cy="369332"/>
           </a:xfrm>
           <a:prstGeom prst="rect">
             <a:avLst/>
@@ -3159,13 +3159,8 @@
             </a:r>
             <a:r>
               <a:rPr lang="en-US" dirty="0" smtClean="0"/>
-              <a:t> SSID = WW101WPA PW=</a:t>
-            </a:r>
-            <a:r>
-              <a:rPr lang="en-US" dirty="0"/>
-              <a:t>kywpa123</a:t>
-            </a:r>
-            <a:endParaRPr lang="en-US" dirty="0" smtClean="0"/>
+              <a:t> SSID = WW101WPA PW = cypresswicedwifi101</a:t>
+            </a:r>
           </a:p>
         </p:txBody>
       </p:sp>
@@ -3292,7 +3287,7 @@
         </p:nvSpPr>
         <p:spPr>
           <a:xfrm>
-            <a:off x="984451" y="2424611"/>
+            <a:off x="984451" y="1795344"/>
             <a:ext cx="5174943" cy="369332"/>
           </a:xfrm>
           <a:prstGeom prst="rect">
@@ -3316,86 +3311,13 @@
       </p:sp>
       <p:sp>
         <p:nvSpPr>
-          <p:cNvPr id="5" name="TextBox 4"/>
-          <p:cNvSpPr txBox="1"/>
-          <p:nvPr/>
-        </p:nvSpPr>
-        <p:spPr>
-          <a:xfrm>
-            <a:off x="2223637" y="1137463"/>
-            <a:ext cx="2696572" cy="369332"/>
-          </a:xfrm>
-          <a:prstGeom prst="rect">
-            <a:avLst/>
-          </a:prstGeom>
-          <a:noFill/>
-        </p:spPr>
-        <p:txBody>
-          <a:bodyPr wrap="none" rtlCol="0">
-            <a:spAutoFit/>
-          </a:bodyPr>
-          <a:lstStyle/>
-          <a:p>
-            <a:pPr algn="ctr"/>
-            <a:r>
-              <a:rPr lang="en-US" b="1" dirty="0" smtClean="0"/>
-              <a:t>OPEN</a:t>
-            </a:r>
-            <a:r>
-              <a:rPr lang="en-US" dirty="0" smtClean="0"/>
-              <a:t> SSID = WW101OPEN</a:t>
-            </a:r>
-          </a:p>
-        </p:txBody>
-      </p:sp>
-      <p:sp>
-        <p:nvSpPr>
-          <p:cNvPr id="6" name="TextBox 5"/>
-          <p:cNvSpPr txBox="1"/>
-          <p:nvPr/>
-        </p:nvSpPr>
-        <p:spPr>
-          <a:xfrm>
-            <a:off x="1768960" y="1506795"/>
-            <a:ext cx="3605924" cy="369332"/>
-          </a:xfrm>
-          <a:prstGeom prst="rect">
-            <a:avLst/>
-          </a:prstGeom>
-          <a:noFill/>
-        </p:spPr>
-        <p:txBody>
-          <a:bodyPr wrap="none" rtlCol="0">
-            <a:spAutoFit/>
-          </a:bodyPr>
-          <a:lstStyle/>
-          <a:p>
-            <a:pPr algn="ctr"/>
-            <a:r>
-              <a:rPr lang="en-US" b="1" dirty="0" smtClean="0"/>
-              <a:t>WEP</a:t>
-            </a:r>
-            <a:r>
-              <a:rPr lang="en-US" dirty="0" smtClean="0"/>
-              <a:t> SSID = WW101WEP PW=</a:t>
-            </a:r>
-            <a:r>
-              <a:rPr lang="en-US" dirty="0" err="1" smtClean="0"/>
-              <a:t>kywep</a:t>
-            </a:r>
-            <a:endParaRPr lang="en-US" dirty="0" smtClean="0"/>
-          </a:p>
-        </p:txBody>
-      </p:sp>
-      <p:sp>
-        <p:nvSpPr>
           <p:cNvPr id="7" name="TextBox 6"/>
           <p:cNvSpPr txBox="1"/>
           <p:nvPr/>
         </p:nvSpPr>
         <p:spPr>
           <a:xfrm>
-            <a:off x="2227419" y="3263993"/>
+            <a:off x="2227419" y="2506907"/>
             <a:ext cx="2689006" cy="1477328"/>
           </a:xfrm>
           <a:prstGeom prst="rect">

</xml_diff>

<commit_message>
Regenerate PDFs of lab manuals (causes modification to docx time stamp too)
</commit_message>
<xml_diff>
--- a/labmanual/English/WW101-Binder-Cover.pptx
+++ b/labmanual/English/WW101-Binder-Cover.pptx
@@ -113,6 +113,10 @@
 </p:presentation>
 </file>
 
+<file path=ppt/revisionInfo.xml><?xml version="1.0" encoding="utf-8"?>
+<p1510:revInfo xmlns:a="http://schemas.openxmlformats.org/drawingml/2006/main" xmlns:r="http://schemas.openxmlformats.org/officeDocument/2006/relationships" xmlns:p1510="http://schemas.microsoft.com/office/powerpoint/2015/10/main"/>
+</file>
+
 <file path=ppt/slideLayouts/slideLayout1.xml><?xml version="1.0" encoding="utf-8"?>
 <p:sldLayout xmlns:a="http://schemas.openxmlformats.org/drawingml/2006/main" xmlns:r="http://schemas.openxmlformats.org/officeDocument/2006/relationships" xmlns:p="http://schemas.openxmlformats.org/presentationml/2006/main" type="title" preserve="1">
   <p:cSld name="Title Slide">
@@ -155,7 +159,7 @@
           </a:lstStyle>
           <a:p>
             <a:r>
-              <a:rPr lang="en-US" smtClean="0"/>
+              <a:rPr lang="en-US"/>
               <a:t>Click to edit Master title style</a:t>
             </a:r>
             <a:endParaRPr lang="en-US" dirty="0"/>
@@ -220,7 +224,7 @@
           </a:lstStyle>
           <a:p>
             <a:r>
-              <a:rPr lang="en-US" smtClean="0"/>
+              <a:rPr lang="en-US"/>
               <a:t>Click to edit Master subtitle style</a:t>
             </a:r>
             <a:endParaRPr lang="en-US" dirty="0"/>
@@ -244,7 +248,7 @@
           <a:p>
             <a:fld id="{FD9117CB-CD87-A145-B0DD-B1FF23D56DC0}" type="datetimeFigureOut">
               <a:rPr lang="en-US" smtClean="0"/>
-              <a:t>5/16/2017</a:t>
+              <a:t>7/13/2017</a:t>
             </a:fld>
             <a:endParaRPr lang="en-US"/>
           </a:p>
@@ -338,7 +342,7 @@
           <a:lstStyle/>
           <a:p>
             <a:r>
-              <a:rPr lang="en-US" smtClean="0"/>
+              <a:rPr lang="en-US"/>
               <a:t>Click to edit Master title style</a:t>
             </a:r>
             <a:endParaRPr lang="en-US" dirty="0"/>
@@ -362,35 +366,35 @@
           <a:p>
             <a:pPr lvl="0"/>
             <a:r>
-              <a:rPr lang="en-US" smtClean="0"/>
+              <a:rPr lang="en-US"/>
               <a:t>Click to edit Master text styles</a:t>
             </a:r>
           </a:p>
           <a:p>
             <a:pPr lvl="1"/>
             <a:r>
-              <a:rPr lang="en-US" smtClean="0"/>
+              <a:rPr lang="en-US"/>
               <a:t>Second level</a:t>
             </a:r>
           </a:p>
           <a:p>
             <a:pPr lvl="2"/>
             <a:r>
-              <a:rPr lang="en-US" smtClean="0"/>
+              <a:rPr lang="en-US"/>
               <a:t>Third level</a:t>
             </a:r>
           </a:p>
           <a:p>
             <a:pPr lvl="3"/>
             <a:r>
-              <a:rPr lang="en-US" smtClean="0"/>
+              <a:rPr lang="en-US"/>
               <a:t>Fourth level</a:t>
             </a:r>
           </a:p>
           <a:p>
             <a:pPr lvl="4"/>
             <a:r>
-              <a:rPr lang="en-US" smtClean="0"/>
+              <a:rPr lang="en-US"/>
               <a:t>Fifth level</a:t>
             </a:r>
             <a:endParaRPr lang="en-US" dirty="0"/>
@@ -414,7 +418,7 @@
           <a:p>
             <a:fld id="{FD9117CB-CD87-A145-B0DD-B1FF23D56DC0}" type="datetimeFigureOut">
               <a:rPr lang="en-US" smtClean="0"/>
-              <a:t>5/16/2017</a:t>
+              <a:t>7/13/2017</a:t>
             </a:fld>
             <a:endParaRPr lang="en-US"/>
           </a:p>
@@ -513,7 +517,7 @@
           <a:lstStyle/>
           <a:p>
             <a:r>
-              <a:rPr lang="en-US" smtClean="0"/>
+              <a:rPr lang="en-US"/>
               <a:t>Click to edit Master title style</a:t>
             </a:r>
             <a:endParaRPr lang="en-US" dirty="0"/>
@@ -542,35 +546,35 @@
           <a:p>
             <a:pPr lvl="0"/>
             <a:r>
-              <a:rPr lang="en-US" smtClean="0"/>
+              <a:rPr lang="en-US"/>
               <a:t>Click to edit Master text styles</a:t>
             </a:r>
           </a:p>
           <a:p>
             <a:pPr lvl="1"/>
             <a:r>
-              <a:rPr lang="en-US" smtClean="0"/>
+              <a:rPr lang="en-US"/>
               <a:t>Second level</a:t>
             </a:r>
           </a:p>
           <a:p>
             <a:pPr lvl="2"/>
             <a:r>
-              <a:rPr lang="en-US" smtClean="0"/>
+              <a:rPr lang="en-US"/>
               <a:t>Third level</a:t>
             </a:r>
           </a:p>
           <a:p>
             <a:pPr lvl="3"/>
             <a:r>
-              <a:rPr lang="en-US" smtClean="0"/>
+              <a:rPr lang="en-US"/>
               <a:t>Fourth level</a:t>
             </a:r>
           </a:p>
           <a:p>
             <a:pPr lvl="4"/>
             <a:r>
-              <a:rPr lang="en-US" smtClean="0"/>
+              <a:rPr lang="en-US"/>
               <a:t>Fifth level</a:t>
             </a:r>
             <a:endParaRPr lang="en-US" dirty="0"/>
@@ -594,7 +598,7 @@
           <a:p>
             <a:fld id="{FD9117CB-CD87-A145-B0DD-B1FF23D56DC0}" type="datetimeFigureOut">
               <a:rPr lang="en-US" smtClean="0"/>
-              <a:t>5/16/2017</a:t>
+              <a:t>7/13/2017</a:t>
             </a:fld>
             <a:endParaRPr lang="en-US"/>
           </a:p>
@@ -688,7 +692,7 @@
           <a:lstStyle/>
           <a:p>
             <a:r>
-              <a:rPr lang="en-US" smtClean="0"/>
+              <a:rPr lang="en-US"/>
               <a:t>Click to edit Master title style</a:t>
             </a:r>
             <a:endParaRPr lang="en-US" dirty="0"/>
@@ -712,35 +716,35 @@
           <a:p>
             <a:pPr lvl="0"/>
             <a:r>
-              <a:rPr lang="en-US" smtClean="0"/>
+              <a:rPr lang="en-US"/>
               <a:t>Click to edit Master text styles</a:t>
             </a:r>
           </a:p>
           <a:p>
             <a:pPr lvl="1"/>
             <a:r>
-              <a:rPr lang="en-US" smtClean="0"/>
+              <a:rPr lang="en-US"/>
               <a:t>Second level</a:t>
             </a:r>
           </a:p>
           <a:p>
             <a:pPr lvl="2"/>
             <a:r>
-              <a:rPr lang="en-US" smtClean="0"/>
+              <a:rPr lang="en-US"/>
               <a:t>Third level</a:t>
             </a:r>
           </a:p>
           <a:p>
             <a:pPr lvl="3"/>
             <a:r>
-              <a:rPr lang="en-US" smtClean="0"/>
+              <a:rPr lang="en-US"/>
               <a:t>Fourth level</a:t>
             </a:r>
           </a:p>
           <a:p>
             <a:pPr lvl="4"/>
             <a:r>
-              <a:rPr lang="en-US" smtClean="0"/>
+              <a:rPr lang="en-US"/>
               <a:t>Fifth level</a:t>
             </a:r>
             <a:endParaRPr lang="en-US" dirty="0"/>
@@ -764,7 +768,7 @@
           <a:p>
             <a:fld id="{FD9117CB-CD87-A145-B0DD-B1FF23D56DC0}" type="datetimeFigureOut">
               <a:rPr lang="en-US" smtClean="0"/>
-              <a:t>5/16/2017</a:t>
+              <a:t>7/13/2017</a:t>
             </a:fld>
             <a:endParaRPr lang="en-US"/>
           </a:p>
@@ -867,7 +871,7 @@
           </a:lstStyle>
           <a:p>
             <a:r>
-              <a:rPr lang="en-US" smtClean="0"/>
+              <a:rPr lang="en-US"/>
               <a:t>Click to edit Master title style</a:t>
             </a:r>
             <a:endParaRPr lang="en-US" dirty="0"/>
@@ -985,7 +989,7 @@
           <a:p>
             <a:pPr lvl="0"/>
             <a:r>
-              <a:rPr lang="en-US" smtClean="0"/>
+              <a:rPr lang="en-US"/>
               <a:t>Click to edit Master text styles</a:t>
             </a:r>
           </a:p>
@@ -1008,7 +1012,7 @@
           <a:p>
             <a:fld id="{FD9117CB-CD87-A145-B0DD-B1FF23D56DC0}" type="datetimeFigureOut">
               <a:rPr lang="en-US" smtClean="0"/>
-              <a:t>5/16/2017</a:t>
+              <a:t>7/13/2017</a:t>
             </a:fld>
             <a:endParaRPr lang="en-US"/>
           </a:p>
@@ -1102,7 +1106,7 @@
           <a:lstStyle/>
           <a:p>
             <a:r>
-              <a:rPr lang="en-US" smtClean="0"/>
+              <a:rPr lang="en-US"/>
               <a:t>Click to edit Master title style</a:t>
             </a:r>
             <a:endParaRPr lang="en-US" dirty="0"/>
@@ -1131,35 +1135,35 @@
           <a:p>
             <a:pPr lvl="0"/>
             <a:r>
-              <a:rPr lang="en-US" smtClean="0"/>
+              <a:rPr lang="en-US"/>
               <a:t>Click to edit Master text styles</a:t>
             </a:r>
           </a:p>
           <a:p>
             <a:pPr lvl="1"/>
             <a:r>
-              <a:rPr lang="en-US" smtClean="0"/>
+              <a:rPr lang="en-US"/>
               <a:t>Second level</a:t>
             </a:r>
           </a:p>
           <a:p>
             <a:pPr lvl="2"/>
             <a:r>
-              <a:rPr lang="en-US" smtClean="0"/>
+              <a:rPr lang="en-US"/>
               <a:t>Third level</a:t>
             </a:r>
           </a:p>
           <a:p>
             <a:pPr lvl="3"/>
             <a:r>
-              <a:rPr lang="en-US" smtClean="0"/>
+              <a:rPr lang="en-US"/>
               <a:t>Fourth level</a:t>
             </a:r>
           </a:p>
           <a:p>
             <a:pPr lvl="4"/>
             <a:r>
-              <a:rPr lang="en-US" smtClean="0"/>
+              <a:rPr lang="en-US"/>
               <a:t>Fifth level</a:t>
             </a:r>
             <a:endParaRPr lang="en-US" dirty="0"/>
@@ -1188,35 +1192,35 @@
           <a:p>
             <a:pPr lvl="0"/>
             <a:r>
-              <a:rPr lang="en-US" smtClean="0"/>
+              <a:rPr lang="en-US"/>
               <a:t>Click to edit Master text styles</a:t>
             </a:r>
           </a:p>
           <a:p>
             <a:pPr lvl="1"/>
             <a:r>
-              <a:rPr lang="en-US" smtClean="0"/>
+              <a:rPr lang="en-US"/>
               <a:t>Second level</a:t>
             </a:r>
           </a:p>
           <a:p>
             <a:pPr lvl="2"/>
             <a:r>
-              <a:rPr lang="en-US" smtClean="0"/>
+              <a:rPr lang="en-US"/>
               <a:t>Third level</a:t>
             </a:r>
           </a:p>
           <a:p>
             <a:pPr lvl="3"/>
             <a:r>
-              <a:rPr lang="en-US" smtClean="0"/>
+              <a:rPr lang="en-US"/>
               <a:t>Fourth level</a:t>
             </a:r>
           </a:p>
           <a:p>
             <a:pPr lvl="4"/>
             <a:r>
-              <a:rPr lang="en-US" smtClean="0"/>
+              <a:rPr lang="en-US"/>
               <a:t>Fifth level</a:t>
             </a:r>
             <a:endParaRPr lang="en-US" dirty="0"/>
@@ -1240,7 +1244,7 @@
           <a:p>
             <a:fld id="{FD9117CB-CD87-A145-B0DD-B1FF23D56DC0}" type="datetimeFigureOut">
               <a:rPr lang="en-US" smtClean="0"/>
-              <a:t>5/16/2017</a:t>
+              <a:t>7/13/2017</a:t>
             </a:fld>
             <a:endParaRPr lang="en-US"/>
           </a:p>
@@ -1339,7 +1343,7 @@
           <a:lstStyle/>
           <a:p>
             <a:r>
-              <a:rPr lang="en-US" smtClean="0"/>
+              <a:rPr lang="en-US"/>
               <a:t>Click to edit Master title style</a:t>
             </a:r>
             <a:endParaRPr lang="en-US" dirty="0"/>
@@ -1405,7 +1409,7 @@
           <a:p>
             <a:pPr lvl="0"/>
             <a:r>
-              <a:rPr lang="en-US" smtClean="0"/>
+              <a:rPr lang="en-US"/>
               <a:t>Click to edit Master text styles</a:t>
             </a:r>
           </a:p>
@@ -1433,35 +1437,35 @@
           <a:p>
             <a:pPr lvl="0"/>
             <a:r>
-              <a:rPr lang="en-US" smtClean="0"/>
+              <a:rPr lang="en-US"/>
               <a:t>Click to edit Master text styles</a:t>
             </a:r>
           </a:p>
           <a:p>
             <a:pPr lvl="1"/>
             <a:r>
-              <a:rPr lang="en-US" smtClean="0"/>
+              <a:rPr lang="en-US"/>
               <a:t>Second level</a:t>
             </a:r>
           </a:p>
           <a:p>
             <a:pPr lvl="2"/>
             <a:r>
-              <a:rPr lang="en-US" smtClean="0"/>
+              <a:rPr lang="en-US"/>
               <a:t>Third level</a:t>
             </a:r>
           </a:p>
           <a:p>
             <a:pPr lvl="3"/>
             <a:r>
-              <a:rPr lang="en-US" smtClean="0"/>
+              <a:rPr lang="en-US"/>
               <a:t>Fourth level</a:t>
             </a:r>
           </a:p>
           <a:p>
             <a:pPr lvl="4"/>
             <a:r>
-              <a:rPr lang="en-US" smtClean="0"/>
+              <a:rPr lang="en-US"/>
               <a:t>Fifth level</a:t>
             </a:r>
             <a:endParaRPr lang="en-US" dirty="0"/>
@@ -1527,7 +1531,7 @@
           <a:p>
             <a:pPr lvl="0"/>
             <a:r>
-              <a:rPr lang="en-US" smtClean="0"/>
+              <a:rPr lang="en-US"/>
               <a:t>Click to edit Master text styles</a:t>
             </a:r>
           </a:p>
@@ -1555,35 +1559,35 @@
           <a:p>
             <a:pPr lvl="0"/>
             <a:r>
-              <a:rPr lang="en-US" smtClean="0"/>
+              <a:rPr lang="en-US"/>
               <a:t>Click to edit Master text styles</a:t>
             </a:r>
           </a:p>
           <a:p>
             <a:pPr lvl="1"/>
             <a:r>
-              <a:rPr lang="en-US" smtClean="0"/>
+              <a:rPr lang="en-US"/>
               <a:t>Second level</a:t>
             </a:r>
           </a:p>
           <a:p>
             <a:pPr lvl="2"/>
             <a:r>
-              <a:rPr lang="en-US" smtClean="0"/>
+              <a:rPr lang="en-US"/>
               <a:t>Third level</a:t>
             </a:r>
           </a:p>
           <a:p>
             <a:pPr lvl="3"/>
             <a:r>
-              <a:rPr lang="en-US" smtClean="0"/>
+              <a:rPr lang="en-US"/>
               <a:t>Fourth level</a:t>
             </a:r>
           </a:p>
           <a:p>
             <a:pPr lvl="4"/>
             <a:r>
-              <a:rPr lang="en-US" smtClean="0"/>
+              <a:rPr lang="en-US"/>
               <a:t>Fifth level</a:t>
             </a:r>
             <a:endParaRPr lang="en-US" dirty="0"/>
@@ -1607,7 +1611,7 @@
           <a:p>
             <a:fld id="{FD9117CB-CD87-A145-B0DD-B1FF23D56DC0}" type="datetimeFigureOut">
               <a:rPr lang="en-US" smtClean="0"/>
-              <a:t>5/16/2017</a:t>
+              <a:t>7/13/2017</a:t>
             </a:fld>
             <a:endParaRPr lang="en-US"/>
           </a:p>
@@ -1701,7 +1705,7 @@
           <a:lstStyle/>
           <a:p>
             <a:r>
-              <a:rPr lang="en-US" smtClean="0"/>
+              <a:rPr lang="en-US"/>
               <a:t>Click to edit Master title style</a:t>
             </a:r>
             <a:endParaRPr lang="en-US" dirty="0"/>
@@ -1725,7 +1729,7 @@
           <a:p>
             <a:fld id="{FD9117CB-CD87-A145-B0DD-B1FF23D56DC0}" type="datetimeFigureOut">
               <a:rPr lang="en-US" smtClean="0"/>
-              <a:t>5/16/2017</a:t>
+              <a:t>7/13/2017</a:t>
             </a:fld>
             <a:endParaRPr lang="en-US"/>
           </a:p>
@@ -1820,7 +1824,7 @@
           <a:p>
             <a:fld id="{FD9117CB-CD87-A145-B0DD-B1FF23D56DC0}" type="datetimeFigureOut">
               <a:rPr lang="en-US" smtClean="0"/>
-              <a:t>5/16/2017</a:t>
+              <a:t>7/13/2017</a:t>
             </a:fld>
             <a:endParaRPr lang="en-US"/>
           </a:p>
@@ -1923,7 +1927,7 @@
           </a:lstStyle>
           <a:p>
             <a:r>
-              <a:rPr lang="en-US" smtClean="0"/>
+              <a:rPr lang="en-US"/>
               <a:t>Click to edit Master title style</a:t>
             </a:r>
             <a:endParaRPr lang="en-US" dirty="0"/>
@@ -1980,35 +1984,35 @@
           <a:p>
             <a:pPr lvl="0"/>
             <a:r>
-              <a:rPr lang="en-US" smtClean="0"/>
+              <a:rPr lang="en-US"/>
               <a:t>Click to edit Master text styles</a:t>
             </a:r>
           </a:p>
           <a:p>
             <a:pPr lvl="1"/>
             <a:r>
-              <a:rPr lang="en-US" smtClean="0"/>
+              <a:rPr lang="en-US"/>
               <a:t>Second level</a:t>
             </a:r>
           </a:p>
           <a:p>
             <a:pPr lvl="2"/>
             <a:r>
-              <a:rPr lang="en-US" smtClean="0"/>
+              <a:rPr lang="en-US"/>
               <a:t>Third level</a:t>
             </a:r>
           </a:p>
           <a:p>
             <a:pPr lvl="3"/>
             <a:r>
-              <a:rPr lang="en-US" smtClean="0"/>
+              <a:rPr lang="en-US"/>
               <a:t>Fourth level</a:t>
             </a:r>
           </a:p>
           <a:p>
             <a:pPr lvl="4"/>
             <a:r>
-              <a:rPr lang="en-US" smtClean="0"/>
+              <a:rPr lang="en-US"/>
               <a:t>Fifth level</a:t>
             </a:r>
             <a:endParaRPr lang="en-US" dirty="0"/>
@@ -2074,7 +2078,7 @@
           <a:p>
             <a:pPr lvl="0"/>
             <a:r>
-              <a:rPr lang="en-US" smtClean="0"/>
+              <a:rPr lang="en-US"/>
               <a:t>Click to edit Master text styles</a:t>
             </a:r>
           </a:p>
@@ -2097,7 +2101,7 @@
           <a:p>
             <a:fld id="{FD9117CB-CD87-A145-B0DD-B1FF23D56DC0}" type="datetimeFigureOut">
               <a:rPr lang="en-US" smtClean="0"/>
-              <a:t>5/16/2017</a:t>
+              <a:t>7/13/2017</a:t>
             </a:fld>
             <a:endParaRPr lang="en-US"/>
           </a:p>
@@ -2200,7 +2204,7 @@
           </a:lstStyle>
           <a:p>
             <a:r>
-              <a:rPr lang="en-US" smtClean="0"/>
+              <a:rPr lang="en-US"/>
               <a:t>Click to edit Master title style</a:t>
             </a:r>
             <a:endParaRPr lang="en-US" dirty="0"/>
@@ -2265,7 +2269,7 @@
           </a:lstStyle>
           <a:p>
             <a:r>
-              <a:rPr lang="en-US" smtClean="0"/>
+              <a:rPr lang="en-US"/>
               <a:t>Drag picture to placeholder or click icon to add</a:t>
             </a:r>
             <a:endParaRPr lang="en-US" dirty="0"/>
@@ -2331,7 +2335,7 @@
           <a:p>
             <a:pPr lvl="0"/>
             <a:r>
-              <a:rPr lang="en-US" smtClean="0"/>
+              <a:rPr lang="en-US"/>
               <a:t>Click to edit Master text styles</a:t>
             </a:r>
           </a:p>
@@ -2354,7 +2358,7 @@
           <a:p>
             <a:fld id="{FD9117CB-CD87-A145-B0DD-B1FF23D56DC0}" type="datetimeFigureOut">
               <a:rPr lang="en-US" smtClean="0"/>
-              <a:t>5/16/2017</a:t>
+              <a:t>7/13/2017</a:t>
             </a:fld>
             <a:endParaRPr lang="en-US"/>
           </a:p>
@@ -2463,7 +2467,7 @@
           <a:lstStyle/>
           <a:p>
             <a:r>
-              <a:rPr lang="en-US" smtClean="0"/>
+              <a:rPr lang="en-US"/>
               <a:t>Click to edit Master title style</a:t>
             </a:r>
             <a:endParaRPr lang="en-US" dirty="0"/>
@@ -2497,35 +2501,35 @@
           <a:p>
             <a:pPr lvl="0"/>
             <a:r>
-              <a:rPr lang="en-US" smtClean="0"/>
+              <a:rPr lang="en-US"/>
               <a:t>Click to edit Master text styles</a:t>
             </a:r>
           </a:p>
           <a:p>
             <a:pPr lvl="1"/>
             <a:r>
-              <a:rPr lang="en-US" smtClean="0"/>
+              <a:rPr lang="en-US"/>
               <a:t>Second level</a:t>
             </a:r>
           </a:p>
           <a:p>
             <a:pPr lvl="2"/>
             <a:r>
-              <a:rPr lang="en-US" smtClean="0"/>
+              <a:rPr lang="en-US"/>
               <a:t>Third level</a:t>
             </a:r>
           </a:p>
           <a:p>
             <a:pPr lvl="3"/>
             <a:r>
-              <a:rPr lang="en-US" smtClean="0"/>
+              <a:rPr lang="en-US"/>
               <a:t>Fourth level</a:t>
             </a:r>
           </a:p>
           <a:p>
             <a:pPr lvl="4"/>
             <a:r>
-              <a:rPr lang="en-US" smtClean="0"/>
+              <a:rPr lang="en-US"/>
               <a:t>Fifth level</a:t>
             </a:r>
             <a:endParaRPr lang="en-US" dirty="0"/>
@@ -2567,7 +2571,7 @@
           <a:p>
             <a:fld id="{FD9117CB-CD87-A145-B0DD-B1FF23D56DC0}" type="datetimeFigureOut">
               <a:rPr lang="en-US" smtClean="0"/>
-              <a:t>5/16/2017</a:t>
+              <a:t>7/13/2017</a:t>
             </a:fld>
             <a:endParaRPr lang="en-US"/>
           </a:p>
@@ -3020,17 +3024,16 @@
           <a:p>
             <a:pPr algn="ctr"/>
             <a:r>
-              <a:rPr lang="en-US" sz="7200" dirty="0" smtClean="0"/>
+              <a:rPr lang="en-US" sz="7200" dirty="0"/>
               <a:t>Cypress Academy</a:t>
             </a:r>
           </a:p>
           <a:p>
             <a:pPr algn="ctr"/>
             <a:r>
-              <a:rPr lang="en-US" sz="7200" dirty="0" smtClean="0"/>
+              <a:rPr lang="en-US" sz="7200" dirty="0"/>
               <a:t>WICED Wi-Fi 101</a:t>
             </a:r>
-            <a:endParaRPr lang="en-US" sz="7200" dirty="0"/>
           </a:p>
         </p:txBody>
       </p:sp>
@@ -3058,38 +3061,37 @@
           <a:p>
             <a:pPr algn="ctr"/>
             <a:r>
-              <a:rPr lang="en-US" sz="2400" dirty="0" smtClean="0"/>
+              <a:rPr lang="en-US" sz="2400" dirty="0"/>
               <a:t>Alan Hawse</a:t>
             </a:r>
           </a:p>
           <a:p>
             <a:pPr algn="ctr"/>
             <a:r>
-              <a:rPr lang="en-US" sz="2400" dirty="0" smtClean="0"/>
+              <a:rPr lang="en-US" sz="2400" dirty="0"/>
               <a:t>Greg Landry</a:t>
             </a:r>
           </a:p>
           <a:p>
             <a:pPr algn="ctr"/>
             <a:r>
-              <a:rPr lang="en-US" sz="2400" dirty="0" smtClean="0"/>
+              <a:rPr lang="en-US" sz="2400" dirty="0"/>
               <a:t>Mike Noel</a:t>
             </a:r>
           </a:p>
           <a:p>
             <a:pPr algn="ctr"/>
             <a:r>
-              <a:rPr lang="en-US" sz="2400" dirty="0" smtClean="0"/>
+              <a:rPr lang="en-US" sz="2400" dirty="0"/>
               <a:t>James Dougherty</a:t>
             </a:r>
           </a:p>
           <a:p>
             <a:pPr algn="ctr"/>
             <a:r>
-              <a:rPr lang="en-US" sz="2400" dirty="0" smtClean="0"/>
+              <a:rPr lang="en-US" sz="2400" dirty="0"/>
               <a:t>Vikram Ramanna</a:t>
             </a:r>
-            <a:endParaRPr lang="en-US" sz="2400" dirty="0"/>
           </a:p>
         </p:txBody>
       </p:sp>
@@ -3103,13 +3105,6 @@
   <p:clrMapOvr>
     <a:masterClrMapping/>
   </p:clrMapOvr>
-  <p:timing>
-    <p:tnLst>
-      <p:par>
-        <p:cTn id="1" dur="indefinite" restart="never" nodeType="tmRoot"/>
-      </p:par>
-    </p:tnLst>
-  </p:timing>
 </p:sld>
 </file>
 
@@ -3154,11 +3149,11 @@
           <a:p>
             <a:pPr algn="ctr"/>
             <a:r>
-              <a:rPr lang="en-US" b="1" dirty="0" smtClean="0"/>
+              <a:rPr lang="en-US" b="1" dirty="0"/>
               <a:t>WPA2</a:t>
             </a:r>
             <a:r>
-              <a:rPr lang="en-US" dirty="0" smtClean="0"/>
+              <a:rPr lang="en-US" dirty="0"/>
               <a:t> SSID = WW101WPA PW = cypresswicedwifi101</a:t>
             </a:r>
           </a:p>
@@ -3187,7 +3182,7 @@
           <a:lstStyle/>
           <a:p>
             <a:r>
-              <a:rPr lang="en-US" sz="1600" dirty="0" smtClean="0"/>
+              <a:rPr lang="en-US" sz="1600" dirty="0"/>
               <a:t>Trouble Shooting Guide: </a:t>
             </a:r>
           </a:p>
@@ -3196,84 +3191,84 @@
           </a:p>
           <a:p>
             <a:r>
-              <a:rPr lang="en-US" sz="1600" dirty="0" smtClean="0"/>
+              <a:rPr lang="en-US" sz="1600" dirty="0"/>
               <a:t>Did you SAVE before you ran Make</a:t>
             </a:r>
           </a:p>
           <a:p>
             <a:r>
-              <a:rPr lang="en-US" sz="1600" dirty="0" smtClean="0"/>
+              <a:rPr lang="en-US" sz="1600" dirty="0"/>
               <a:t>Did you call </a:t>
             </a:r>
             <a:r>
-              <a:rPr lang="en-US" sz="1600" dirty="0" err="1" smtClean="0"/>
+              <a:rPr lang="en-US" sz="1600" dirty="0" err="1"/>
               <a:t>wiced_init</a:t>
             </a:r>
             <a:r>
-              <a:rPr lang="en-US" sz="1600" dirty="0" smtClean="0"/>
-              <a:t> before any other </a:t>
-            </a:r>
-            <a:r>
-              <a:rPr lang="en-US" sz="1600" smtClean="0"/>
-              <a:t>WICEDfunction</a:t>
-            </a:r>
-            <a:endParaRPr lang="en-US" sz="1600" dirty="0" smtClean="0"/>
-          </a:p>
-          <a:p>
-            <a:r>
-              <a:rPr lang="en-US" sz="1600" dirty="0" smtClean="0"/>
+              <a:rPr lang="en-US" sz="1600" dirty="0"/>
+              <a:t> before any </a:t>
+            </a:r>
+            <a:r>
+              <a:rPr lang="en-US" sz="1600"/>
+              <a:t>other WICED function</a:t>
+            </a:r>
+            <a:endParaRPr lang="en-US" sz="1600" dirty="0"/>
+          </a:p>
+          <a:p>
+            <a:r>
+              <a:rPr lang="en-US" sz="1600" dirty="0"/>
               <a:t>Did you call the </a:t>
             </a:r>
             <a:r>
-              <a:rPr lang="en-US" sz="1600" dirty="0" err="1" smtClean="0"/>
+              <a:rPr lang="en-US" sz="1600" dirty="0" err="1"/>
               <a:t>init</a:t>
             </a:r>
             <a:r>
-              <a:rPr lang="en-US" sz="1600" dirty="0" smtClean="0"/>
+              <a:rPr lang="en-US" sz="1600" dirty="0"/>
               <a:t> function for each peripheral used</a:t>
             </a:r>
           </a:p>
           <a:p>
             <a:r>
-              <a:rPr lang="en-US" sz="1600" dirty="0" smtClean="0"/>
+              <a:rPr lang="en-US" sz="1600" dirty="0"/>
               <a:t>Do the project folder, C file, and make file all have the same name</a:t>
             </a:r>
           </a:p>
           <a:p>
             <a:r>
-              <a:rPr lang="en-US" sz="1600" dirty="0" smtClean="0"/>
+              <a:rPr lang="en-US" sz="1600" dirty="0"/>
               <a:t>Is the APP NAME in the make file unique</a:t>
             </a:r>
           </a:p>
           <a:p>
             <a:r>
-              <a:rPr lang="en-US" sz="1600" dirty="0" smtClean="0"/>
+              <a:rPr lang="en-US" sz="1600" dirty="0"/>
               <a:t>Did you clean after modifying certificates</a:t>
             </a:r>
           </a:p>
           <a:p>
             <a:r>
-              <a:rPr lang="en-US" sz="1600" dirty="0" smtClean="0"/>
+              <a:rPr lang="en-US" sz="1600" dirty="0"/>
               <a:t>Did you call </a:t>
             </a:r>
             <a:r>
-              <a:rPr lang="en-US" sz="1600" dirty="0" err="1" smtClean="0"/>
+              <a:rPr lang="en-US" sz="1600" dirty="0" err="1"/>
               <a:t>wiced_network_up</a:t>
             </a:r>
             <a:r>
-              <a:rPr lang="en-US" sz="1600" dirty="0" smtClean="0"/>
+              <a:rPr lang="en-US" sz="1600" dirty="0"/>
               <a:t> before any network activities</a:t>
             </a:r>
           </a:p>
           <a:p>
             <a:r>
-              <a:rPr lang="en-US" sz="1600" dirty="0" smtClean="0"/>
+              <a:rPr lang="en-US" sz="1600" dirty="0"/>
               <a:t>Did you create all structures before referencing them in function calls</a:t>
             </a:r>
           </a:p>
           <a:p>
             <a:r>
-              <a:rPr lang="en-US" sz="1600" dirty="0" smtClean="0"/>
+              <a:rPr lang="en-US" sz="1600" dirty="0"/>
               <a:t>Did you use WPRINT_APP_INFO for debugging (e.g. WICED return codes)</a:t>
             </a:r>
           </a:p>
@@ -3303,7 +3298,7 @@
           <a:p>
             <a:pPr algn="ctr"/>
             <a:r>
-              <a:rPr lang="en-US" dirty="0" smtClean="0"/>
+              <a:rPr lang="en-US" dirty="0"/>
               <a:t>wwep.ww101.cypress.com IP Address = 198.51.100.3</a:t>
             </a:r>
           </a:p>
@@ -3338,13 +3333,8 @@
             </a:r>
             <a:r>
               <a:rPr lang="en-US" dirty="0"/>
-              <a:t>: </a:t>
-            </a:r>
-            <a:r>
-              <a:rPr lang="en-US" dirty="0" smtClean="0"/>
-              <a:t>198.51.100.0/24</a:t>
-            </a:r>
-            <a:endParaRPr lang="en-US" dirty="0"/>
+              <a:t>: 198.51.100.0/24</a:t>
+            </a:r>
           </a:p>
           <a:p>
             <a:pPr algn="ctr"/>
@@ -3401,11 +3391,7 @@
           <a:p>
             <a:r>
               <a:rPr lang="en-US" sz="1050"/>
-              <a:t>v</a:t>
-            </a:r>
-            <a:r>
-              <a:rPr lang="en-US" sz="1050" smtClean="0"/>
-              <a:t>ersion 1.2</a:t>
+              <a:t>version 1.2</a:t>
             </a:r>
             <a:endParaRPr lang="en-US" sz="1050" dirty="0"/>
           </a:p>
@@ -3421,13 +3407,6 @@
   <p:clrMapOvr>
     <a:masterClrMapping/>
   </p:clrMapOvr>
-  <p:timing>
-    <p:tnLst>
-      <p:par>
-        <p:cTn id="1" dur="indefinite" restart="never" nodeType="tmRoot"/>
-      </p:par>
-    </p:tnLst>
-  </p:timing>
 </p:sld>
 </file>
 

</xml_diff>

<commit_message>
Change revision to 1.4
</commit_message>
<xml_diff>
--- a/labmanual/English/WW101-Binder-Cover.pptx
+++ b/labmanual/English/WW101-Binder-Cover.pptx
@@ -248,7 +248,7 @@
           <a:p>
             <a:fld id="{FD9117CB-CD87-A145-B0DD-B1FF23D56DC0}" type="datetimeFigureOut">
               <a:rPr lang="en-US" smtClean="0"/>
-              <a:t>7/19/2017</a:t>
+              <a:t>8/29/2017</a:t>
             </a:fld>
             <a:endParaRPr lang="en-US"/>
           </a:p>
@@ -418,7 +418,7 @@
           <a:p>
             <a:fld id="{FD9117CB-CD87-A145-B0DD-B1FF23D56DC0}" type="datetimeFigureOut">
               <a:rPr lang="en-US" smtClean="0"/>
-              <a:t>7/19/2017</a:t>
+              <a:t>8/29/2017</a:t>
             </a:fld>
             <a:endParaRPr lang="en-US"/>
           </a:p>
@@ -598,7 +598,7 @@
           <a:p>
             <a:fld id="{FD9117CB-CD87-A145-B0DD-B1FF23D56DC0}" type="datetimeFigureOut">
               <a:rPr lang="en-US" smtClean="0"/>
-              <a:t>7/19/2017</a:t>
+              <a:t>8/29/2017</a:t>
             </a:fld>
             <a:endParaRPr lang="en-US"/>
           </a:p>
@@ -768,7 +768,7 @@
           <a:p>
             <a:fld id="{FD9117CB-CD87-A145-B0DD-B1FF23D56DC0}" type="datetimeFigureOut">
               <a:rPr lang="en-US" smtClean="0"/>
-              <a:t>7/19/2017</a:t>
+              <a:t>8/29/2017</a:t>
             </a:fld>
             <a:endParaRPr lang="en-US"/>
           </a:p>
@@ -1012,7 +1012,7 @@
           <a:p>
             <a:fld id="{FD9117CB-CD87-A145-B0DD-B1FF23D56DC0}" type="datetimeFigureOut">
               <a:rPr lang="en-US" smtClean="0"/>
-              <a:t>7/19/2017</a:t>
+              <a:t>8/29/2017</a:t>
             </a:fld>
             <a:endParaRPr lang="en-US"/>
           </a:p>
@@ -1244,7 +1244,7 @@
           <a:p>
             <a:fld id="{FD9117CB-CD87-A145-B0DD-B1FF23D56DC0}" type="datetimeFigureOut">
               <a:rPr lang="en-US" smtClean="0"/>
-              <a:t>7/19/2017</a:t>
+              <a:t>8/29/2017</a:t>
             </a:fld>
             <a:endParaRPr lang="en-US"/>
           </a:p>
@@ -1611,7 +1611,7 @@
           <a:p>
             <a:fld id="{FD9117CB-CD87-A145-B0DD-B1FF23D56DC0}" type="datetimeFigureOut">
               <a:rPr lang="en-US" smtClean="0"/>
-              <a:t>7/19/2017</a:t>
+              <a:t>8/29/2017</a:t>
             </a:fld>
             <a:endParaRPr lang="en-US"/>
           </a:p>
@@ -1729,7 +1729,7 @@
           <a:p>
             <a:fld id="{FD9117CB-CD87-A145-B0DD-B1FF23D56DC0}" type="datetimeFigureOut">
               <a:rPr lang="en-US" smtClean="0"/>
-              <a:t>7/19/2017</a:t>
+              <a:t>8/29/2017</a:t>
             </a:fld>
             <a:endParaRPr lang="en-US"/>
           </a:p>
@@ -1824,7 +1824,7 @@
           <a:p>
             <a:fld id="{FD9117CB-CD87-A145-B0DD-B1FF23D56DC0}" type="datetimeFigureOut">
               <a:rPr lang="en-US" smtClean="0"/>
-              <a:t>7/19/2017</a:t>
+              <a:t>8/29/2017</a:t>
             </a:fld>
             <a:endParaRPr lang="en-US"/>
           </a:p>
@@ -2101,7 +2101,7 @@
           <a:p>
             <a:fld id="{FD9117CB-CD87-A145-B0DD-B1FF23D56DC0}" type="datetimeFigureOut">
               <a:rPr lang="en-US" smtClean="0"/>
-              <a:t>7/19/2017</a:t>
+              <a:t>8/29/2017</a:t>
             </a:fld>
             <a:endParaRPr lang="en-US"/>
           </a:p>
@@ -2358,7 +2358,7 @@
           <a:p>
             <a:fld id="{FD9117CB-CD87-A145-B0DD-B1FF23D56DC0}" type="datetimeFigureOut">
               <a:rPr lang="en-US" smtClean="0"/>
-              <a:t>7/19/2017</a:t>
+              <a:t>8/29/2017</a:t>
             </a:fld>
             <a:endParaRPr lang="en-US"/>
           </a:p>
@@ -2571,7 +2571,7 @@
           <a:p>
             <a:fld id="{FD9117CB-CD87-A145-B0DD-B1FF23D56DC0}" type="datetimeFigureOut">
               <a:rPr lang="en-US" smtClean="0"/>
-              <a:t>7/19/2017</a:t>
+              <a:t>8/29/2017</a:t>
             </a:fld>
             <a:endParaRPr lang="en-US"/>
           </a:p>
@@ -3124,9 +3124,10 @@
           <a:lstStyle/>
           <a:p>
             <a:r>
-              <a:rPr lang="en-US" sz="1050" dirty="0"/>
-              <a:t>Version 1.3</a:t>
-            </a:r>
+              <a:rPr lang="en-US" sz="1050"/>
+              <a:t>Version 1.4</a:t>
+            </a:r>
+            <a:endParaRPr lang="en-US" sz="1050" dirty="0"/>
           </a:p>
         </p:txBody>
       </p:sp>

</xml_diff>

<commit_message>
Update formatting on all sections
</commit_message>
<xml_diff>
--- a/labmanual/English/WW101-Binder-Cover.pptx
+++ b/labmanual/English/WW101-Binder-Cover.pptx
@@ -248,7 +248,7 @@
           <a:p>
             <a:fld id="{FD9117CB-CD87-A145-B0DD-B1FF23D56DC0}" type="datetimeFigureOut">
               <a:rPr lang="en-US" smtClean="0"/>
-              <a:t>8/29/2017</a:t>
+              <a:t>9/11/2017</a:t>
             </a:fld>
             <a:endParaRPr lang="en-US"/>
           </a:p>
@@ -418,7 +418,7 @@
           <a:p>
             <a:fld id="{FD9117CB-CD87-A145-B0DD-B1FF23D56DC0}" type="datetimeFigureOut">
               <a:rPr lang="en-US" smtClean="0"/>
-              <a:t>8/29/2017</a:t>
+              <a:t>9/11/2017</a:t>
             </a:fld>
             <a:endParaRPr lang="en-US"/>
           </a:p>
@@ -598,7 +598,7 @@
           <a:p>
             <a:fld id="{FD9117CB-CD87-A145-B0DD-B1FF23D56DC0}" type="datetimeFigureOut">
               <a:rPr lang="en-US" smtClean="0"/>
-              <a:t>8/29/2017</a:t>
+              <a:t>9/11/2017</a:t>
             </a:fld>
             <a:endParaRPr lang="en-US"/>
           </a:p>
@@ -768,7 +768,7 @@
           <a:p>
             <a:fld id="{FD9117CB-CD87-A145-B0DD-B1FF23D56DC0}" type="datetimeFigureOut">
               <a:rPr lang="en-US" smtClean="0"/>
-              <a:t>8/29/2017</a:t>
+              <a:t>9/11/2017</a:t>
             </a:fld>
             <a:endParaRPr lang="en-US"/>
           </a:p>
@@ -1012,7 +1012,7 @@
           <a:p>
             <a:fld id="{FD9117CB-CD87-A145-B0DD-B1FF23D56DC0}" type="datetimeFigureOut">
               <a:rPr lang="en-US" smtClean="0"/>
-              <a:t>8/29/2017</a:t>
+              <a:t>9/11/2017</a:t>
             </a:fld>
             <a:endParaRPr lang="en-US"/>
           </a:p>
@@ -1244,7 +1244,7 @@
           <a:p>
             <a:fld id="{FD9117CB-CD87-A145-B0DD-B1FF23D56DC0}" type="datetimeFigureOut">
               <a:rPr lang="en-US" smtClean="0"/>
-              <a:t>8/29/2017</a:t>
+              <a:t>9/11/2017</a:t>
             </a:fld>
             <a:endParaRPr lang="en-US"/>
           </a:p>
@@ -1611,7 +1611,7 @@
           <a:p>
             <a:fld id="{FD9117CB-CD87-A145-B0DD-B1FF23D56DC0}" type="datetimeFigureOut">
               <a:rPr lang="en-US" smtClean="0"/>
-              <a:t>8/29/2017</a:t>
+              <a:t>9/11/2017</a:t>
             </a:fld>
             <a:endParaRPr lang="en-US"/>
           </a:p>
@@ -1729,7 +1729,7 @@
           <a:p>
             <a:fld id="{FD9117CB-CD87-A145-B0DD-B1FF23D56DC0}" type="datetimeFigureOut">
               <a:rPr lang="en-US" smtClean="0"/>
-              <a:t>8/29/2017</a:t>
+              <a:t>9/11/2017</a:t>
             </a:fld>
             <a:endParaRPr lang="en-US"/>
           </a:p>
@@ -1824,7 +1824,7 @@
           <a:p>
             <a:fld id="{FD9117CB-CD87-A145-B0DD-B1FF23D56DC0}" type="datetimeFigureOut">
               <a:rPr lang="en-US" smtClean="0"/>
-              <a:t>8/29/2017</a:t>
+              <a:t>9/11/2017</a:t>
             </a:fld>
             <a:endParaRPr lang="en-US"/>
           </a:p>
@@ -2101,7 +2101,7 @@
           <a:p>
             <a:fld id="{FD9117CB-CD87-A145-B0DD-B1FF23D56DC0}" type="datetimeFigureOut">
               <a:rPr lang="en-US" smtClean="0"/>
-              <a:t>8/29/2017</a:t>
+              <a:t>9/11/2017</a:t>
             </a:fld>
             <a:endParaRPr lang="en-US"/>
           </a:p>
@@ -2358,7 +2358,7 @@
           <a:p>
             <a:fld id="{FD9117CB-CD87-A145-B0DD-B1FF23D56DC0}" type="datetimeFigureOut">
               <a:rPr lang="en-US" smtClean="0"/>
-              <a:t>8/29/2017</a:t>
+              <a:t>9/11/2017</a:t>
             </a:fld>
             <a:endParaRPr lang="en-US"/>
           </a:p>
@@ -2571,7 +2571,7 @@
           <a:p>
             <a:fld id="{FD9117CB-CD87-A145-B0DD-B1FF23D56DC0}" type="datetimeFigureOut">
               <a:rPr lang="en-US" smtClean="0"/>
-              <a:t>8/29/2017</a:t>
+              <a:t>9/11/2017</a:t>
             </a:fld>
             <a:endParaRPr lang="en-US"/>
           </a:p>
@@ -3125,7 +3125,7 @@
           <a:p>
             <a:r>
               <a:rPr lang="en-US" sz="1050"/>
-              <a:t>Version 1.4</a:t>
+              <a:t>Version 2.0</a:t>
             </a:r>
             <a:endParaRPr lang="en-US" sz="1050" dirty="0"/>
           </a:p>

</xml_diff>

<commit_message>
Update manual for 07b as AWS, 07c as HTTP, and 07d as MQTT. Also affects the signoff sheet, intro (agenda) and class project. The revision on the binder is now 2.1.
</commit_message>
<xml_diff>
--- a/labmanual/English/WW101-Binder-Cover.pptx
+++ b/labmanual/English/WW101-Binder-Cover.pptx
@@ -248,7 +248,7 @@
           <a:p>
             <a:fld id="{FD9117CB-CD87-A145-B0DD-B1FF23D56DC0}" type="datetimeFigureOut">
               <a:rPr lang="en-US" smtClean="0"/>
-              <a:t>9/11/2017</a:t>
+              <a:t>9/21/2017</a:t>
             </a:fld>
             <a:endParaRPr lang="en-US"/>
           </a:p>
@@ -418,7 +418,7 @@
           <a:p>
             <a:fld id="{FD9117CB-CD87-A145-B0DD-B1FF23D56DC0}" type="datetimeFigureOut">
               <a:rPr lang="en-US" smtClean="0"/>
-              <a:t>9/11/2017</a:t>
+              <a:t>9/21/2017</a:t>
             </a:fld>
             <a:endParaRPr lang="en-US"/>
           </a:p>
@@ -598,7 +598,7 @@
           <a:p>
             <a:fld id="{FD9117CB-CD87-A145-B0DD-B1FF23D56DC0}" type="datetimeFigureOut">
               <a:rPr lang="en-US" smtClean="0"/>
-              <a:t>9/11/2017</a:t>
+              <a:t>9/21/2017</a:t>
             </a:fld>
             <a:endParaRPr lang="en-US"/>
           </a:p>
@@ -768,7 +768,7 @@
           <a:p>
             <a:fld id="{FD9117CB-CD87-A145-B0DD-B1FF23D56DC0}" type="datetimeFigureOut">
               <a:rPr lang="en-US" smtClean="0"/>
-              <a:t>9/11/2017</a:t>
+              <a:t>9/21/2017</a:t>
             </a:fld>
             <a:endParaRPr lang="en-US"/>
           </a:p>
@@ -1012,7 +1012,7 @@
           <a:p>
             <a:fld id="{FD9117CB-CD87-A145-B0DD-B1FF23D56DC0}" type="datetimeFigureOut">
               <a:rPr lang="en-US" smtClean="0"/>
-              <a:t>9/11/2017</a:t>
+              <a:t>9/21/2017</a:t>
             </a:fld>
             <a:endParaRPr lang="en-US"/>
           </a:p>
@@ -1244,7 +1244,7 @@
           <a:p>
             <a:fld id="{FD9117CB-CD87-A145-B0DD-B1FF23D56DC0}" type="datetimeFigureOut">
               <a:rPr lang="en-US" smtClean="0"/>
-              <a:t>9/11/2017</a:t>
+              <a:t>9/21/2017</a:t>
             </a:fld>
             <a:endParaRPr lang="en-US"/>
           </a:p>
@@ -1611,7 +1611,7 @@
           <a:p>
             <a:fld id="{FD9117CB-CD87-A145-B0DD-B1FF23D56DC0}" type="datetimeFigureOut">
               <a:rPr lang="en-US" smtClean="0"/>
-              <a:t>9/11/2017</a:t>
+              <a:t>9/21/2017</a:t>
             </a:fld>
             <a:endParaRPr lang="en-US"/>
           </a:p>
@@ -1729,7 +1729,7 @@
           <a:p>
             <a:fld id="{FD9117CB-CD87-A145-B0DD-B1FF23D56DC0}" type="datetimeFigureOut">
               <a:rPr lang="en-US" smtClean="0"/>
-              <a:t>9/11/2017</a:t>
+              <a:t>9/21/2017</a:t>
             </a:fld>
             <a:endParaRPr lang="en-US"/>
           </a:p>
@@ -1824,7 +1824,7 @@
           <a:p>
             <a:fld id="{FD9117CB-CD87-A145-B0DD-B1FF23D56DC0}" type="datetimeFigureOut">
               <a:rPr lang="en-US" smtClean="0"/>
-              <a:t>9/11/2017</a:t>
+              <a:t>9/21/2017</a:t>
             </a:fld>
             <a:endParaRPr lang="en-US"/>
           </a:p>
@@ -2101,7 +2101,7 @@
           <a:p>
             <a:fld id="{FD9117CB-CD87-A145-B0DD-B1FF23D56DC0}" type="datetimeFigureOut">
               <a:rPr lang="en-US" smtClean="0"/>
-              <a:t>9/11/2017</a:t>
+              <a:t>9/21/2017</a:t>
             </a:fld>
             <a:endParaRPr lang="en-US"/>
           </a:p>
@@ -2358,7 +2358,7 @@
           <a:p>
             <a:fld id="{FD9117CB-CD87-A145-B0DD-B1FF23D56DC0}" type="datetimeFigureOut">
               <a:rPr lang="en-US" smtClean="0"/>
-              <a:t>9/11/2017</a:t>
+              <a:t>9/21/2017</a:t>
             </a:fld>
             <a:endParaRPr lang="en-US"/>
           </a:p>
@@ -2571,7 +2571,7 @@
           <a:p>
             <a:fld id="{FD9117CB-CD87-A145-B0DD-B1FF23D56DC0}" type="datetimeFigureOut">
               <a:rPr lang="en-US" smtClean="0"/>
-              <a:t>9/11/2017</a:t>
+              <a:t>9/21/2017</a:t>
             </a:fld>
             <a:endParaRPr lang="en-US"/>
           </a:p>
@@ -3124,10 +3124,9 @@
           <a:lstStyle/>
           <a:p>
             <a:r>
-              <a:rPr lang="en-US" sz="1050"/>
-              <a:t>Version 2.0</a:t>
-            </a:r>
-            <a:endParaRPr lang="en-US" sz="1050" dirty="0"/>
+              <a:rPr lang="en-US" sz="1050" dirty="0"/>
+              <a:t>Version 2.1</a:t>
+            </a:r>
           </a:p>
         </p:txBody>
       </p:sp>

</xml_diff>

<commit_message>
Remove SSID and AWS passwords from material. Update FW for shield board after uupdating comments and formatting.
</commit_message>
<xml_diff>
--- a/labmanual/English/WW101-Binder-Cover.pptx
+++ b/labmanual/English/WW101-Binder-Cover.pptx
@@ -9,7 +9,7 @@
     <p:sldId id="257" r:id="rId3"/>
   </p:sldIdLst>
   <p:sldSz cx="6858000" cy="9144000" type="letter"/>
-  <p:notesSz cx="6858000" cy="9144000"/>
+  <p:notesSz cx="6858000" cy="9296400"/>
   <p:defaultTextStyle>
     <a:defPPr>
       <a:defRPr lang="en-US"/>
@@ -248,7 +248,7 @@
           <a:p>
             <a:fld id="{FD9117CB-CD87-A145-B0DD-B1FF23D56DC0}" type="datetimeFigureOut">
               <a:rPr lang="en-US" smtClean="0"/>
-              <a:t>9/21/2017</a:t>
+              <a:t>10/25/2017</a:t>
             </a:fld>
             <a:endParaRPr lang="en-US"/>
           </a:p>
@@ -418,7 +418,7 @@
           <a:p>
             <a:fld id="{FD9117CB-CD87-A145-B0DD-B1FF23D56DC0}" type="datetimeFigureOut">
               <a:rPr lang="en-US" smtClean="0"/>
-              <a:t>9/21/2017</a:t>
+              <a:t>10/25/2017</a:t>
             </a:fld>
             <a:endParaRPr lang="en-US"/>
           </a:p>
@@ -598,7 +598,7 @@
           <a:p>
             <a:fld id="{FD9117CB-CD87-A145-B0DD-B1FF23D56DC0}" type="datetimeFigureOut">
               <a:rPr lang="en-US" smtClean="0"/>
-              <a:t>9/21/2017</a:t>
+              <a:t>10/25/2017</a:t>
             </a:fld>
             <a:endParaRPr lang="en-US"/>
           </a:p>
@@ -768,7 +768,7 @@
           <a:p>
             <a:fld id="{FD9117CB-CD87-A145-B0DD-B1FF23D56DC0}" type="datetimeFigureOut">
               <a:rPr lang="en-US" smtClean="0"/>
-              <a:t>9/21/2017</a:t>
+              <a:t>10/25/2017</a:t>
             </a:fld>
             <a:endParaRPr lang="en-US"/>
           </a:p>
@@ -1012,7 +1012,7 @@
           <a:p>
             <a:fld id="{FD9117CB-CD87-A145-B0DD-B1FF23D56DC0}" type="datetimeFigureOut">
               <a:rPr lang="en-US" smtClean="0"/>
-              <a:t>9/21/2017</a:t>
+              <a:t>10/25/2017</a:t>
             </a:fld>
             <a:endParaRPr lang="en-US"/>
           </a:p>
@@ -1244,7 +1244,7 @@
           <a:p>
             <a:fld id="{FD9117CB-CD87-A145-B0DD-B1FF23D56DC0}" type="datetimeFigureOut">
               <a:rPr lang="en-US" smtClean="0"/>
-              <a:t>9/21/2017</a:t>
+              <a:t>10/25/2017</a:t>
             </a:fld>
             <a:endParaRPr lang="en-US"/>
           </a:p>
@@ -1611,7 +1611,7 @@
           <a:p>
             <a:fld id="{FD9117CB-CD87-A145-B0DD-B1FF23D56DC0}" type="datetimeFigureOut">
               <a:rPr lang="en-US" smtClean="0"/>
-              <a:t>9/21/2017</a:t>
+              <a:t>10/25/2017</a:t>
             </a:fld>
             <a:endParaRPr lang="en-US"/>
           </a:p>
@@ -1729,7 +1729,7 @@
           <a:p>
             <a:fld id="{FD9117CB-CD87-A145-B0DD-B1FF23D56DC0}" type="datetimeFigureOut">
               <a:rPr lang="en-US" smtClean="0"/>
-              <a:t>9/21/2017</a:t>
+              <a:t>10/25/2017</a:t>
             </a:fld>
             <a:endParaRPr lang="en-US"/>
           </a:p>
@@ -1824,7 +1824,7 @@
           <a:p>
             <a:fld id="{FD9117CB-CD87-A145-B0DD-B1FF23D56DC0}" type="datetimeFigureOut">
               <a:rPr lang="en-US" smtClean="0"/>
-              <a:t>9/21/2017</a:t>
+              <a:t>10/25/2017</a:t>
             </a:fld>
             <a:endParaRPr lang="en-US"/>
           </a:p>
@@ -2101,7 +2101,7 @@
           <a:p>
             <a:fld id="{FD9117CB-CD87-A145-B0DD-B1FF23D56DC0}" type="datetimeFigureOut">
               <a:rPr lang="en-US" smtClean="0"/>
-              <a:t>9/21/2017</a:t>
+              <a:t>10/25/2017</a:t>
             </a:fld>
             <a:endParaRPr lang="en-US"/>
           </a:p>
@@ -2358,7 +2358,7 @@
           <a:p>
             <a:fld id="{FD9117CB-CD87-A145-B0DD-B1FF23D56DC0}" type="datetimeFigureOut">
               <a:rPr lang="en-US" smtClean="0"/>
-              <a:t>9/21/2017</a:t>
+              <a:t>10/25/2017</a:t>
             </a:fld>
             <a:endParaRPr lang="en-US"/>
           </a:p>
@@ -2571,7 +2571,7 @@
           <a:p>
             <a:fld id="{FD9117CB-CD87-A145-B0DD-B1FF23D56DC0}" type="datetimeFigureOut">
               <a:rPr lang="en-US" smtClean="0"/>
-              <a:t>9/21/2017</a:t>
+              <a:t>10/25/2017</a:t>
             </a:fld>
             <a:endParaRPr lang="en-US"/>
           </a:p>
@@ -3162,40 +3162,6 @@
       </p:grpSpPr>
       <p:sp>
         <p:nvSpPr>
-          <p:cNvPr id="2" name="TextBox 1"/>
-          <p:cNvSpPr txBox="1"/>
-          <p:nvPr/>
-        </p:nvSpPr>
-        <p:spPr>
-          <a:xfrm>
-            <a:off x="832268" y="1137463"/>
-            <a:ext cx="5184497" cy="369332"/>
-          </a:xfrm>
-          <a:prstGeom prst="rect">
-            <a:avLst/>
-          </a:prstGeom>
-          <a:noFill/>
-        </p:spPr>
-        <p:txBody>
-          <a:bodyPr wrap="none" rtlCol="0">
-            <a:spAutoFit/>
-          </a:bodyPr>
-          <a:lstStyle/>
-          <a:p>
-            <a:pPr algn="ctr"/>
-            <a:r>
-              <a:rPr lang="en-US" b="1" dirty="0"/>
-              <a:t>WPA2</a:t>
-            </a:r>
-            <a:r>
-              <a:rPr lang="en-US" dirty="0"/>
-              <a:t> SSID = WW101WPA PW = cypresswicedwifi101</a:t>
-            </a:r>
-          </a:p>
-        </p:txBody>
-      </p:sp>
-      <p:sp>
-        <p:nvSpPr>
           <p:cNvPr id="3" name="TextBox 2"/>
           <p:cNvSpPr txBox="1"/>
           <p:nvPr/>
@@ -3317,7 +3283,7 @@
         </p:nvSpPr>
         <p:spPr>
           <a:xfrm>
-            <a:off x="984451" y="1795344"/>
+            <a:off x="984451" y="2981047"/>
             <a:ext cx="5174943" cy="369332"/>
           </a:xfrm>
           <a:prstGeom prst="rect">
@@ -3347,7 +3313,7 @@
         </p:nvSpPr>
         <p:spPr>
           <a:xfrm>
-            <a:off x="2227419" y="2506907"/>
+            <a:off x="2096794" y="3602175"/>
             <a:ext cx="2689006" cy="1477328"/>
           </a:xfrm>
           <a:prstGeom prst="rect">
@@ -3375,14 +3341,30 @@
             <a:pPr algn="ctr"/>
             <a:r>
               <a:rPr lang="pl-PL" dirty="0"/>
-              <a:t>Gateway:198.51.100.1</a:t>
+              <a:t>Gateway:</a:t>
+            </a:r>
+            <a:r>
+              <a:rPr lang="en-US" dirty="0"/>
+              <a:t> </a:t>
+            </a:r>
+            <a:r>
+              <a:rPr lang="pl-PL" dirty="0"/>
+              <a:t>198.51.100.1</a:t>
             </a:r>
           </a:p>
           <a:p>
             <a:pPr algn="ctr"/>
             <a:r>
               <a:rPr lang="tr-TR" dirty="0"/>
-              <a:t>Netmask:255.255.255.0</a:t>
+              <a:t>Netmask:</a:t>
+            </a:r>
+            <a:r>
+              <a:rPr lang="en-US" dirty="0"/>
+              <a:t> </a:t>
+            </a:r>
+            <a:r>
+              <a:rPr lang="tr-TR" dirty="0"/>
+              <a:t>255.255.255.0</a:t>
             </a:r>
           </a:p>
           <a:p>
@@ -3399,6 +3381,58 @@
               <a:t>DNS2: 8.8.4.4</a:t>
             </a:r>
             <a:endParaRPr lang="en-US" dirty="0"/>
+          </a:p>
+        </p:txBody>
+      </p:sp>
+      <p:sp>
+        <p:nvSpPr>
+          <p:cNvPr id="5" name="Rectangle: Rounded Corners 4">
+            <a:extLst>
+              <a:ext uri="{FF2B5EF4-FFF2-40B4-BE49-F238E27FC236}">
+                <a16:creationId xmlns:a16="http://schemas.microsoft.com/office/drawing/2014/main" id="{96EA5AB6-AD4B-44A3-A89E-04C39981A554}"/>
+              </a:ext>
+            </a:extLst>
+          </p:cNvPr>
+          <p:cNvSpPr/>
+          <p:nvPr/>
+        </p:nvSpPr>
+        <p:spPr>
+          <a:xfrm>
+            <a:off x="2240784" y="1467059"/>
+            <a:ext cx="2461844" cy="914399"/>
+          </a:xfrm>
+          <a:prstGeom prst="roundRect">
+            <a:avLst/>
+          </a:prstGeom>
+          <a:noFill/>
+          <a:ln>
+            <a:solidFill>
+              <a:schemeClr val="tx1"/>
+            </a:solidFill>
+          </a:ln>
+        </p:spPr>
+        <p:style>
+          <a:lnRef idx="2">
+            <a:schemeClr val="accent1">
+              <a:shade val="50000"/>
+            </a:schemeClr>
+          </a:lnRef>
+          <a:fillRef idx="1">
+            <a:schemeClr val="accent1"/>
+          </a:fillRef>
+          <a:effectRef idx="0">
+            <a:schemeClr val="accent1"/>
+          </a:effectRef>
+          <a:fontRef idx="minor">
+            <a:schemeClr val="lt1"/>
+          </a:fontRef>
+        </p:style>
+        <p:txBody>
+          <a:bodyPr rtlCol="0" anchor="ctr"/>
+          <a:lstStyle/>
+          <a:p>
+            <a:pPr algn="ctr"/>
+            <a:endParaRPr lang="en-US"/>
           </a:p>
         </p:txBody>
       </p:sp>

</xml_diff>

<commit_message>
ARH updates to manual
</commit_message>
<xml_diff>
--- a/labmanual/English/WW101-Binder-Cover.pptx
+++ b/labmanual/English/WW101-Binder-Cover.pptx
@@ -248,7 +248,7 @@
           <a:p>
             <a:fld id="{FD9117CB-CD87-A145-B0DD-B1FF23D56DC0}" type="datetimeFigureOut">
               <a:rPr lang="en-US" smtClean="0"/>
-              <a:t>10/25/2017</a:t>
+              <a:t>10/30/2017</a:t>
             </a:fld>
             <a:endParaRPr lang="en-US"/>
           </a:p>
@@ -418,7 +418,7 @@
           <a:p>
             <a:fld id="{FD9117CB-CD87-A145-B0DD-B1FF23D56DC0}" type="datetimeFigureOut">
               <a:rPr lang="en-US" smtClean="0"/>
-              <a:t>10/25/2017</a:t>
+              <a:t>10/30/2017</a:t>
             </a:fld>
             <a:endParaRPr lang="en-US"/>
           </a:p>
@@ -598,7 +598,7 @@
           <a:p>
             <a:fld id="{FD9117CB-CD87-A145-B0DD-B1FF23D56DC0}" type="datetimeFigureOut">
               <a:rPr lang="en-US" smtClean="0"/>
-              <a:t>10/25/2017</a:t>
+              <a:t>10/30/2017</a:t>
             </a:fld>
             <a:endParaRPr lang="en-US"/>
           </a:p>
@@ -768,7 +768,7 @@
           <a:p>
             <a:fld id="{FD9117CB-CD87-A145-B0DD-B1FF23D56DC0}" type="datetimeFigureOut">
               <a:rPr lang="en-US" smtClean="0"/>
-              <a:t>10/25/2017</a:t>
+              <a:t>10/30/2017</a:t>
             </a:fld>
             <a:endParaRPr lang="en-US"/>
           </a:p>
@@ -1012,7 +1012,7 @@
           <a:p>
             <a:fld id="{FD9117CB-CD87-A145-B0DD-B1FF23D56DC0}" type="datetimeFigureOut">
               <a:rPr lang="en-US" smtClean="0"/>
-              <a:t>10/25/2017</a:t>
+              <a:t>10/30/2017</a:t>
             </a:fld>
             <a:endParaRPr lang="en-US"/>
           </a:p>
@@ -1244,7 +1244,7 @@
           <a:p>
             <a:fld id="{FD9117CB-CD87-A145-B0DD-B1FF23D56DC0}" type="datetimeFigureOut">
               <a:rPr lang="en-US" smtClean="0"/>
-              <a:t>10/25/2017</a:t>
+              <a:t>10/30/2017</a:t>
             </a:fld>
             <a:endParaRPr lang="en-US"/>
           </a:p>
@@ -1611,7 +1611,7 @@
           <a:p>
             <a:fld id="{FD9117CB-CD87-A145-B0DD-B1FF23D56DC0}" type="datetimeFigureOut">
               <a:rPr lang="en-US" smtClean="0"/>
-              <a:t>10/25/2017</a:t>
+              <a:t>10/30/2017</a:t>
             </a:fld>
             <a:endParaRPr lang="en-US"/>
           </a:p>
@@ -1729,7 +1729,7 @@
           <a:p>
             <a:fld id="{FD9117CB-CD87-A145-B0DD-B1FF23D56DC0}" type="datetimeFigureOut">
               <a:rPr lang="en-US" smtClean="0"/>
-              <a:t>10/25/2017</a:t>
+              <a:t>10/30/2017</a:t>
             </a:fld>
             <a:endParaRPr lang="en-US"/>
           </a:p>
@@ -1824,7 +1824,7 @@
           <a:p>
             <a:fld id="{FD9117CB-CD87-A145-B0DD-B1FF23D56DC0}" type="datetimeFigureOut">
               <a:rPr lang="en-US" smtClean="0"/>
-              <a:t>10/25/2017</a:t>
+              <a:t>10/30/2017</a:t>
             </a:fld>
             <a:endParaRPr lang="en-US"/>
           </a:p>
@@ -2101,7 +2101,7 @@
           <a:p>
             <a:fld id="{FD9117CB-CD87-A145-B0DD-B1FF23D56DC0}" type="datetimeFigureOut">
               <a:rPr lang="en-US" smtClean="0"/>
-              <a:t>10/25/2017</a:t>
+              <a:t>10/30/2017</a:t>
             </a:fld>
             <a:endParaRPr lang="en-US"/>
           </a:p>
@@ -2358,7 +2358,7 @@
           <a:p>
             <a:fld id="{FD9117CB-CD87-A145-B0DD-B1FF23D56DC0}" type="datetimeFigureOut">
               <a:rPr lang="en-US" smtClean="0"/>
-              <a:t>10/25/2017</a:t>
+              <a:t>10/30/2017</a:t>
             </a:fld>
             <a:endParaRPr lang="en-US"/>
           </a:p>
@@ -2571,7 +2571,7 @@
           <a:p>
             <a:fld id="{FD9117CB-CD87-A145-B0DD-B1FF23D56DC0}" type="datetimeFigureOut">
               <a:rPr lang="en-US" smtClean="0"/>
-              <a:t>10/25/2017</a:t>
+              <a:t>10/30/2017</a:t>
             </a:fld>
             <a:endParaRPr lang="en-US"/>
           </a:p>
@@ -3184,7 +3184,7 @@
           <a:p>
             <a:r>
               <a:rPr lang="en-US" sz="1600" dirty="0"/>
-              <a:t>Trouble Shooting Guide: </a:t>
+              <a:t>Trouble Shooting Checklist: </a:t>
             </a:r>
           </a:p>
           <a:p>
@@ -3193,7 +3193,7 @@
           <a:p>
             <a:r>
               <a:rPr lang="en-US" sz="1600" dirty="0"/>
-              <a:t>Did you SAVE before you ran Make</a:t>
+              <a:t>Did you SAVE before you ran Make?</a:t>
             </a:r>
           </a:p>
           <a:p>
@@ -3207,13 +3207,8 @@
             </a:r>
             <a:r>
               <a:rPr lang="en-US" sz="1600" dirty="0"/>
-              <a:t> before any </a:t>
-            </a:r>
-            <a:r>
-              <a:rPr lang="en-US" sz="1600"/>
-              <a:t>other WICED function</a:t>
-            </a:r>
-            <a:endParaRPr lang="en-US" sz="1600" dirty="0"/>
+              <a:t> before any other WICED function?</a:t>
+            </a:r>
           </a:p>
           <a:p>
             <a:r>
@@ -3226,25 +3221,25 @@
             </a:r>
             <a:r>
               <a:rPr lang="en-US" sz="1600" dirty="0"/>
-              <a:t> function for each peripheral used</a:t>
+              <a:t> function for each peripheral used?</a:t>
             </a:r>
           </a:p>
           <a:p>
             <a:r>
               <a:rPr lang="en-US" sz="1600" dirty="0"/>
-              <a:t>Do the project folder, C file, and make file all have the same name</a:t>
+              <a:t>Do the project folder, C file, and make file all have the same name?</a:t>
             </a:r>
           </a:p>
           <a:p>
             <a:r>
               <a:rPr lang="en-US" sz="1600" dirty="0"/>
-              <a:t>Is the APP NAME in the make file unique</a:t>
+              <a:t>Is the APP NAME in the make file unique?</a:t>
             </a:r>
           </a:p>
           <a:p>
             <a:r>
               <a:rPr lang="en-US" sz="1600" dirty="0"/>
-              <a:t>Did you clean after modifying certificates</a:t>
+              <a:t>Did you clean after modifying certificates or other non-c/h files?</a:t>
             </a:r>
           </a:p>
           <a:p>
@@ -3258,19 +3253,19 @@
             </a:r>
             <a:r>
               <a:rPr lang="en-US" sz="1600" dirty="0"/>
-              <a:t> before any network activities</a:t>
+              <a:t> before any network activities?</a:t>
             </a:r>
           </a:p>
           <a:p>
             <a:r>
               <a:rPr lang="en-US" sz="1600" dirty="0"/>
-              <a:t>Did you create all structures before referencing them in function calls</a:t>
+              <a:t>Did you create all structures before referencing them in function calls?</a:t>
             </a:r>
           </a:p>
           <a:p>
             <a:r>
               <a:rPr lang="en-US" sz="1600" dirty="0"/>
-              <a:t>Did you use WPRINT_APP_INFO for debugging (e.g. WICED return codes)</a:t>
+              <a:t>Did you use WPRINT_APP_INFO for debugging (e.g. WICED return codes)?</a:t>
             </a:r>
           </a:p>
         </p:txBody>

</xml_diff>

<commit_message>
Updates from WW1812 in Detroit. Split chatper 6 into 6A and 6B.
</commit_message>
<xml_diff>
--- a/labmanual/English/WW101-Binder-Cover.pptx
+++ b/labmanual/English/WW101-Binder-Cover.pptx
@@ -248,7 +248,7 @@
           <a:p>
             <a:fld id="{FD9117CB-CD87-A145-B0DD-B1FF23D56DC0}" type="datetimeFigureOut">
               <a:rPr lang="en-US" smtClean="0"/>
-              <a:t>10/30/2017</a:t>
+              <a:t>3/13/2018</a:t>
             </a:fld>
             <a:endParaRPr lang="en-US"/>
           </a:p>
@@ -418,7 +418,7 @@
           <a:p>
             <a:fld id="{FD9117CB-CD87-A145-B0DD-B1FF23D56DC0}" type="datetimeFigureOut">
               <a:rPr lang="en-US" smtClean="0"/>
-              <a:t>10/30/2017</a:t>
+              <a:t>3/13/2018</a:t>
             </a:fld>
             <a:endParaRPr lang="en-US"/>
           </a:p>
@@ -598,7 +598,7 @@
           <a:p>
             <a:fld id="{FD9117CB-CD87-A145-B0DD-B1FF23D56DC0}" type="datetimeFigureOut">
               <a:rPr lang="en-US" smtClean="0"/>
-              <a:t>10/30/2017</a:t>
+              <a:t>3/13/2018</a:t>
             </a:fld>
             <a:endParaRPr lang="en-US"/>
           </a:p>
@@ -768,7 +768,7 @@
           <a:p>
             <a:fld id="{FD9117CB-CD87-A145-B0DD-B1FF23D56DC0}" type="datetimeFigureOut">
               <a:rPr lang="en-US" smtClean="0"/>
-              <a:t>10/30/2017</a:t>
+              <a:t>3/13/2018</a:t>
             </a:fld>
             <a:endParaRPr lang="en-US"/>
           </a:p>
@@ -1012,7 +1012,7 @@
           <a:p>
             <a:fld id="{FD9117CB-CD87-A145-B0DD-B1FF23D56DC0}" type="datetimeFigureOut">
               <a:rPr lang="en-US" smtClean="0"/>
-              <a:t>10/30/2017</a:t>
+              <a:t>3/13/2018</a:t>
             </a:fld>
             <a:endParaRPr lang="en-US"/>
           </a:p>
@@ -1244,7 +1244,7 @@
           <a:p>
             <a:fld id="{FD9117CB-CD87-A145-B0DD-B1FF23D56DC0}" type="datetimeFigureOut">
               <a:rPr lang="en-US" smtClean="0"/>
-              <a:t>10/30/2017</a:t>
+              <a:t>3/13/2018</a:t>
             </a:fld>
             <a:endParaRPr lang="en-US"/>
           </a:p>
@@ -1611,7 +1611,7 @@
           <a:p>
             <a:fld id="{FD9117CB-CD87-A145-B0DD-B1FF23D56DC0}" type="datetimeFigureOut">
               <a:rPr lang="en-US" smtClean="0"/>
-              <a:t>10/30/2017</a:t>
+              <a:t>3/13/2018</a:t>
             </a:fld>
             <a:endParaRPr lang="en-US"/>
           </a:p>
@@ -1729,7 +1729,7 @@
           <a:p>
             <a:fld id="{FD9117CB-CD87-A145-B0DD-B1FF23D56DC0}" type="datetimeFigureOut">
               <a:rPr lang="en-US" smtClean="0"/>
-              <a:t>10/30/2017</a:t>
+              <a:t>3/13/2018</a:t>
             </a:fld>
             <a:endParaRPr lang="en-US"/>
           </a:p>
@@ -1824,7 +1824,7 @@
           <a:p>
             <a:fld id="{FD9117CB-CD87-A145-B0DD-B1FF23D56DC0}" type="datetimeFigureOut">
               <a:rPr lang="en-US" smtClean="0"/>
-              <a:t>10/30/2017</a:t>
+              <a:t>3/13/2018</a:t>
             </a:fld>
             <a:endParaRPr lang="en-US"/>
           </a:p>
@@ -2101,7 +2101,7 @@
           <a:p>
             <a:fld id="{FD9117CB-CD87-A145-B0DD-B1FF23D56DC0}" type="datetimeFigureOut">
               <a:rPr lang="en-US" smtClean="0"/>
-              <a:t>10/30/2017</a:t>
+              <a:t>3/13/2018</a:t>
             </a:fld>
             <a:endParaRPr lang="en-US"/>
           </a:p>
@@ -2358,7 +2358,7 @@
           <a:p>
             <a:fld id="{FD9117CB-CD87-A145-B0DD-B1FF23D56DC0}" type="datetimeFigureOut">
               <a:rPr lang="en-US" smtClean="0"/>
-              <a:t>10/30/2017</a:t>
+              <a:t>3/13/2018</a:t>
             </a:fld>
             <a:endParaRPr lang="en-US"/>
           </a:p>
@@ -2571,7 +2571,7 @@
           <a:p>
             <a:fld id="{FD9117CB-CD87-A145-B0DD-B1FF23D56DC0}" type="datetimeFigureOut">
               <a:rPr lang="en-US" smtClean="0"/>
-              <a:t>10/30/2017</a:t>
+              <a:t>3/13/2018</a:t>
             </a:fld>
             <a:endParaRPr lang="en-US"/>
           </a:p>
@@ -3125,7 +3125,7 @@
           <a:p>
             <a:r>
               <a:rPr lang="en-US" sz="1050" dirty="0"/>
-              <a:t>Version 2.1</a:t>
+              <a:t>Version 2.2</a:t>
             </a:r>
           </a:p>
         </p:txBody>

</xml_diff>